<commit_message>
Deployed 738f31c with MkDocs version: 1.3.1
</commit_message>
<xml_diff>
--- a/aulas/11-branch-and-bound/slides.pptx
+++ b/aulas/11-branch-and-bound/slides.pptx
@@ -9569,30 +9569,22 @@
               <a:buNone/>
             </a:pPr>
             <a:r>
+              <a:rPr lang="pt-BR" sz="1400">
+                <a:latin typeface="Verdana" panose="020B0604030504040204" pitchFamily="34" charset="0"/>
+                <a:ea typeface="Verdana" panose="020B0604030504040204" pitchFamily="34" charset="0"/>
+                <a:cs typeface="Verdana" panose="020B0604030504040204" pitchFamily="34" charset="0"/>
+                <a:sym typeface="Calibri"/>
+              </a:rPr>
+              <a:t>Compare </a:t>
+            </a:r>
+            <a:r>
               <a:rPr lang="pt-BR" sz="1400" dirty="0">
                 <a:latin typeface="Verdana" panose="020B0604030504040204" pitchFamily="34" charset="0"/>
                 <a:ea typeface="Verdana" panose="020B0604030504040204" pitchFamily="34" charset="0"/>
                 <a:cs typeface="Verdana" panose="020B0604030504040204" pitchFamily="34" charset="0"/>
                 <a:sym typeface="Calibri"/>
               </a:rPr>
-              <a:t>Você vai encontrar o pseudocódigo disponível no roteiro.</a:t>
-            </a:r>
-          </a:p>
-          <a:p>
-            <a:pPr marL="0" lvl="0" indent="0">
-              <a:lnSpc>
-                <a:spcPct val="90000"/>
-              </a:lnSpc>
-              <a:buNone/>
-            </a:pPr>
-            <a:r>
-              <a:rPr lang="pt-BR" sz="1400" dirty="0">
-                <a:latin typeface="Verdana" panose="020B0604030504040204" pitchFamily="34" charset="0"/>
-                <a:ea typeface="Verdana" panose="020B0604030504040204" pitchFamily="34" charset="0"/>
-                <a:cs typeface="Verdana" panose="020B0604030504040204" pitchFamily="34" charset="0"/>
-                <a:sym typeface="Calibri"/>
-              </a:rPr>
-              <a:t>Compare a solução obtida com as versões anteriores. </a:t>
+              <a:t>a solução obtida com as versões anteriores. </a:t>
             </a:r>
           </a:p>
           <a:p>

</xml_diff>